<commit_message>
uploading final versions of PPTs
</commit_message>
<xml_diff>
--- a/assets/presentation/Teach Thru Talk  Presentation.pptx
+++ b/assets/presentation/Teach Thru Talk  Presentation.pptx
@@ -8103,7 +8103,7 @@
                   <a:schemeClr val="tx1"/>
                 </a:solidFill>
               </a:rPr>
-              <a:t>Teach Thru Talk is where these three opportunities converge.</a:t>
+              <a:t>Teach Thru Talk is where these three opportunities converge!</a:t>
             </a:r>
             <a:endParaRPr sz="2000" dirty="0">
               <a:solidFill>
@@ -8780,12 +8780,20 @@
               <a:buChar char="●"/>
             </a:pPr>
             <a:r>
+              <a:rPr lang="en">
+                <a:solidFill>
+                  <a:schemeClr val="tx1"/>
+                </a:solidFill>
+              </a:rPr>
+              <a:t>Our </a:t>
+            </a:r>
+            <a:r>
               <a:rPr lang="en" dirty="0">
                 <a:solidFill>
                   <a:schemeClr val="tx1"/>
                 </a:solidFill>
               </a:rPr>
-              <a:t> Our app was deployed to Heroku, utilizes </a:t>
+              <a:t>app was deployed to Heroku, utilizes </a:t>
             </a:r>
             <a:r>
               <a:rPr lang="en" dirty="0" err="1">
@@ -8862,7 +8870,7 @@
                   <a:schemeClr val="tx1"/>
                 </a:solidFill>
               </a:rPr>
-              <a:t>Our team worked on all different aspects of code,  with their respective snippets of code being share via commits to a shared </a:t>
+              <a:t>Our team worked on all different aspects of code, with their respective snippets of code being share via commits to a shared </a:t>
             </a:r>
             <a:r>
               <a:rPr lang="en-CA" dirty="0" err="1">

</xml_diff>

<commit_message>
fixing typos in presentation
</commit_message>
<xml_diff>
--- a/assets/presentation/Teach Thru Talk  Presentation.pptx
+++ b/assets/presentation/Teach Thru Talk  Presentation.pptx
@@ -8780,20 +8780,12 @@
               <a:buChar char="●"/>
             </a:pPr>
             <a:r>
-              <a:rPr lang="en">
-                <a:solidFill>
-                  <a:schemeClr val="tx1"/>
-                </a:solidFill>
-              </a:rPr>
-              <a:t>Our </a:t>
-            </a:r>
-            <a:r>
               <a:rPr lang="en" dirty="0">
                 <a:solidFill>
                   <a:schemeClr val="tx1"/>
                 </a:solidFill>
               </a:rPr>
-              <a:t>app was deployed to Heroku, utilizes </a:t>
+              <a:t>Our app was deployed to Heroku, utilizes </a:t>
             </a:r>
             <a:r>
               <a:rPr lang="en" dirty="0" err="1">
@@ -8870,7 +8862,7 @@
                   <a:schemeClr val="tx1"/>
                 </a:solidFill>
               </a:rPr>
-              <a:t>Our team worked on all different aspects of code, with their respective snippets of code being share via commits to a shared </a:t>
+              <a:t>Our team worked on all different aspects of code, with their respective snippets of code being shared via commits to a shared </a:t>
             </a:r>
             <a:r>
               <a:rPr lang="en-CA" dirty="0" err="1">

</xml_diff>